<commit_message>
Added skeleton structure of thesis and part of introduction
</commit_message>
<xml_diff>
--- a/Dokument/Entwürfe/01 Intro.pptx
+++ b/Dokument/Entwürfe/01 Intro.pptx
@@ -5,10 +5,10 @@
     <p:sldMasterId id="2147483651" r:id="rId1"/>
   </p:sldMasterIdLst>
   <p:notesMasterIdLst>
-    <p:notesMasterId r:id="rId10"/>
+    <p:notesMasterId r:id="rId11"/>
   </p:notesMasterIdLst>
   <p:handoutMasterIdLst>
-    <p:handoutMasterId r:id="rId11"/>
+    <p:handoutMasterId r:id="rId12"/>
   </p:handoutMasterIdLst>
   <p:sldIdLst>
     <p:sldId id="261" r:id="rId2"/>
@@ -16,9 +16,10 @@
     <p:sldId id="277" r:id="rId4"/>
     <p:sldId id="278" r:id="rId5"/>
     <p:sldId id="279" r:id="rId6"/>
-    <p:sldId id="281" r:id="rId7"/>
-    <p:sldId id="282" r:id="rId8"/>
-    <p:sldId id="283" r:id="rId9"/>
+    <p:sldId id="286" r:id="rId7"/>
+    <p:sldId id="281" r:id="rId8"/>
+    <p:sldId id="282" r:id="rId9"/>
+    <p:sldId id="283" r:id="rId10"/>
   </p:sldIdLst>
   <p:sldSz cx="9144000" cy="5143500" type="screen16x9"/>
   <p:notesSz cx="6858000" cy="9144000"/>
@@ -210,7 +211,7 @@
           <a:p>
             <a:fld id="{F4DF2165-45DD-4E6A-8D88-991CFCF20576}" type="datetimeFigureOut">
               <a:rPr lang="de-DE" smtClean="0"/>
-              <a:t>05.05.17</a:t>
+              <a:t>08.05.17</a:t>
             </a:fld>
             <a:endParaRPr lang="de-DE"/>
           </a:p>
@@ -375,7 +376,7 @@
           <a:p>
             <a:fld id="{DBB2A775-C49D-45BA-A919-7D687A0440E7}" type="datetimeFigureOut">
               <a:rPr lang="de-DE" smtClean="0"/>
-              <a:t>05.05.17</a:t>
+              <a:t>08.05.17</a:t>
             </a:fld>
             <a:endParaRPr lang="de-DE"/>
           </a:p>
@@ -3426,7 +3427,6 @@
               <a:rPr lang="de-DE" dirty="0" smtClean="0"/>
               <a:t> in EDL-File:</a:t>
             </a:r>
-            <a:endParaRPr lang="de-DE" dirty="0" smtClean="0"/>
           </a:p>
           <a:p>
             <a:pPr lvl="1">
@@ -4295,31 +4295,26 @@
               </a:lnSpc>
             </a:pPr>
             <a:r>
+              <a:rPr lang="de-DE" dirty="0" smtClean="0"/>
+              <a:t>Kompression von Daten</a:t>
+            </a:r>
+            <a:endParaRPr lang="de-DE" dirty="0"/>
+          </a:p>
+          <a:p>
+            <a:pPr lvl="1">
+              <a:lnSpc>
+                <a:spcPct val="100000"/>
+              </a:lnSpc>
+            </a:pPr>
+            <a:r>
               <a:rPr lang="de-DE" dirty="0"/>
-              <a:t>Verwandte Arbeiten (?)</a:t>
-            </a:r>
-          </a:p>
-          <a:p>
-            <a:pPr lvl="1">
-              <a:lnSpc>
-                <a:spcPct val="100000"/>
-              </a:lnSpc>
-            </a:pPr>
-            <a:r>
-              <a:rPr lang="de-DE" dirty="0"/>
-              <a:t>Kompression in Datenbanken</a:t>
-            </a:r>
-          </a:p>
-          <a:p>
-            <a:pPr lvl="1">
-              <a:lnSpc>
-                <a:spcPct val="100000"/>
-              </a:lnSpc>
-            </a:pPr>
-            <a:r>
-              <a:rPr lang="de-DE" dirty="0"/>
-              <a:t>Sicherheit in der Datenverarbeitung</a:t>
-            </a:r>
+              <a:t>Sicherheit </a:t>
+            </a:r>
+            <a:r>
+              <a:rPr lang="de-DE" dirty="0" smtClean="0"/>
+              <a:t>in Datenbanksystemen</a:t>
+            </a:r>
+            <a:endParaRPr lang="de-DE" dirty="0"/>
           </a:p>
           <a:p>
             <a:pPr lvl="1">
@@ -4342,6 +4337,18 @@
             <a:r>
               <a:rPr lang="de-DE" dirty="0" err="1" smtClean="0"/>
               <a:t>Extensions</a:t>
+            </a:r>
+            <a:endParaRPr lang="de-DE" dirty="0" smtClean="0"/>
+          </a:p>
+          <a:p>
+            <a:pPr lvl="1">
+              <a:lnSpc>
+                <a:spcPct val="100000"/>
+              </a:lnSpc>
+            </a:pPr>
+            <a:r>
+              <a:rPr lang="de-DE" dirty="0" smtClean="0"/>
+              <a:t>Verwandte Arbeiten</a:t>
             </a:r>
             <a:endParaRPr lang="de-DE" dirty="0"/>
           </a:p>
@@ -4544,7 +4551,11 @@
             </a:pPr>
             <a:r>
               <a:rPr lang="de-DE" dirty="0" smtClean="0"/>
-              <a:t>3. Untersuchungen</a:t>
+              <a:t>3. </a:t>
+            </a:r>
+            <a:r>
+              <a:rPr lang="de-DE" dirty="0" smtClean="0"/>
+              <a:t>Intel SGX</a:t>
             </a:r>
             <a:endParaRPr lang="de-DE" dirty="0"/>
           </a:p>
@@ -4555,20 +4566,14 @@
               </a:lnSpc>
             </a:pPr>
             <a:r>
-              <a:rPr lang="de-DE" dirty="0"/>
-              <a:t>Verwandte Arbeiten (?)</a:t>
-            </a:r>
-          </a:p>
-          <a:p>
-            <a:pPr lvl="1">
-              <a:lnSpc>
-                <a:spcPct val="100000"/>
-              </a:lnSpc>
-            </a:pPr>
-            <a:r>
-              <a:rPr lang="de-DE" dirty="0"/>
-              <a:t>Intel SGX SDK</a:t>
-            </a:r>
+              <a:rPr lang="de-DE" dirty="0" smtClean="0"/>
+              <a:t>Entwickeln von </a:t>
+            </a:r>
+            <a:r>
+              <a:rPr lang="de-DE" dirty="0" err="1" smtClean="0"/>
+              <a:t>Enclaves</a:t>
+            </a:r>
+            <a:endParaRPr lang="de-DE" dirty="0"/>
           </a:p>
         </p:txBody>
       </p:sp>
@@ -4576,7 +4581,6 @@
         <p:nvCxnSpPr>
           <p:cNvPr id="13" name="Gerade Verbindung 12"/>
           <p:cNvCxnSpPr>
-            <a:stCxn id="9" idx="1"/>
             <a:endCxn id="4" idx="3"/>
           </p:cNvCxnSpPr>
           <p:nvPr/>
@@ -4584,7 +4588,7 @@
         <p:spPr>
           <a:xfrm flipH="1" flipV="1">
             <a:off x="2433033" y="1665050"/>
-            <a:ext cx="1491915" cy="735482"/>
+            <a:ext cx="1675141" cy="184771"/>
           </a:xfrm>
           <a:prstGeom prst="line">
             <a:avLst/>
@@ -4609,15 +4613,14 @@
         <p:nvCxnSpPr>
           <p:cNvPr id="15" name="Gerade Verbindung 14"/>
           <p:cNvCxnSpPr>
-            <a:stCxn id="9" idx="1"/>
             <a:endCxn id="10" idx="3"/>
           </p:cNvCxnSpPr>
           <p:nvPr/>
         </p:nvCxnSpPr>
         <p:spPr>
           <a:xfrm flipH="1">
-            <a:off x="2693846" y="2400532"/>
-            <a:ext cx="1231102" cy="1136036"/>
+            <a:off x="2693846" y="2032853"/>
+            <a:ext cx="1414328" cy="1503715"/>
           </a:xfrm>
           <a:prstGeom prst="line">
             <a:avLst/>
@@ -4642,15 +4645,14 @@
         <p:nvCxnSpPr>
           <p:cNvPr id="17" name="Gerade Verbindung 16"/>
           <p:cNvCxnSpPr>
-            <a:stCxn id="9" idx="2"/>
             <a:endCxn id="11" idx="0"/>
           </p:cNvCxnSpPr>
           <p:nvPr/>
         </p:nvCxnSpPr>
         <p:spPr>
-          <a:xfrm flipH="1">
-            <a:off x="4438343" y="3190778"/>
-            <a:ext cx="79290" cy="344026"/>
+          <a:xfrm>
+            <a:off x="4424855" y="2269041"/>
+            <a:ext cx="13488" cy="1265763"/>
           </a:xfrm>
           <a:prstGeom prst="line">
             <a:avLst/>
@@ -4867,7 +4869,7 @@
               <a:buNone/>
             </a:pPr>
             <a:r>
-              <a:rPr lang="de-DE" smtClean="0"/>
+              <a:rPr lang="de-DE" dirty="0" smtClean="0"/>
               <a:t>4. </a:t>
             </a:r>
             <a:r>
@@ -4883,14 +4885,13 @@
           <p:cNvPr id="37" name="Gerade Verbindung 36"/>
           <p:cNvCxnSpPr>
             <a:stCxn id="23" idx="1"/>
-            <a:endCxn id="9" idx="3"/>
           </p:cNvCxnSpPr>
           <p:nvPr/>
         </p:nvCxnSpPr>
         <p:spPr>
           <a:xfrm flipH="1">
-            <a:off x="5110318" y="1336689"/>
-            <a:ext cx="1001176" cy="1063843"/>
+            <a:off x="4887310" y="1336689"/>
+            <a:ext cx="1224184" cy="1143752"/>
           </a:xfrm>
           <a:prstGeom prst="line">
             <a:avLst/>
@@ -5108,7 +5109,15 @@
             </a:pPr>
             <a:r>
               <a:rPr lang="de-DE" dirty="0" smtClean="0"/>
-              <a:t>5. Ergebnisse</a:t>
+              <a:t>5</a:t>
+            </a:r>
+            <a:r>
+              <a:rPr lang="de-DE" smtClean="0"/>
+              <a:t>. </a:t>
+            </a:r>
+            <a:r>
+              <a:rPr lang="de-DE" smtClean="0"/>
+              <a:t>Ergebnisse</a:t>
             </a:r>
             <a:endParaRPr lang="de-DE" dirty="0"/>
           </a:p>
@@ -5142,14 +5151,13 @@
           <p:cNvPr id="41" name="Gerade Verbindung 40"/>
           <p:cNvCxnSpPr>
             <a:stCxn id="39" idx="1"/>
-            <a:endCxn id="9" idx="3"/>
           </p:cNvCxnSpPr>
           <p:nvPr/>
         </p:nvCxnSpPr>
         <p:spPr>
-          <a:xfrm flipH="1" flipV="1">
-            <a:off x="5110318" y="2400532"/>
-            <a:ext cx="1001176" cy="154942"/>
+          <a:xfrm flipH="1">
+            <a:off x="4887310" y="2555474"/>
+            <a:ext cx="1224184" cy="135174"/>
           </a:xfrm>
           <a:prstGeom prst="line">
             <a:avLst/>
@@ -5366,12 +5374,8 @@
               <a:buNone/>
             </a:pPr>
             <a:r>
-              <a:rPr lang="de-DE" smtClean="0"/>
-              <a:t>6. </a:t>
-            </a:r>
-            <a:r>
               <a:rPr lang="de-DE" dirty="0" smtClean="0"/>
-              <a:t>Fazit</a:t>
+              <a:t>6. Fazit</a:t>
             </a:r>
             <a:endParaRPr lang="de-DE" dirty="0"/>
           </a:p>
@@ -5381,15 +5385,14 @@
         <p:nvCxnSpPr>
           <p:cNvPr id="45" name="Gerade Verbindung 44"/>
           <p:cNvCxnSpPr>
-            <a:stCxn id="9" idx="3"/>
             <a:endCxn id="43" idx="1"/>
           </p:cNvCxnSpPr>
           <p:nvPr/>
         </p:nvCxnSpPr>
         <p:spPr>
           <a:xfrm>
-            <a:off x="5110318" y="2400532"/>
-            <a:ext cx="1546469" cy="1636893"/>
+            <a:off x="4887310" y="2900855"/>
+            <a:ext cx="1769477" cy="1136570"/>
           </a:xfrm>
           <a:prstGeom prst="line">
             <a:avLst/>
@@ -6586,19 +6589,11 @@
             </a:pPr>
             <a:r>
               <a:rPr lang="de-DE" dirty="0" smtClean="0"/>
-              <a:t>Verwandte Arbeiten</a:t>
-            </a:r>
-            <a:endParaRPr lang="de-DE" dirty="0"/>
-          </a:p>
-          <a:p>
-            <a:pPr lvl="1">
-              <a:lnSpc>
-                <a:spcPct val="100000"/>
-              </a:lnSpc>
-            </a:pPr>
+              <a:t>Kompression </a:t>
+            </a:r>
             <a:r>
               <a:rPr lang="de-DE" dirty="0" smtClean="0"/>
-              <a:t>Kompression in Datenbanken</a:t>
+              <a:t>in Datenbanken</a:t>
             </a:r>
           </a:p>
           <a:p>
@@ -6696,7 +6691,7 @@
           <a:p>
             <a:r>
               <a:rPr lang="de-DE" dirty="0" smtClean="0"/>
-              <a:t>Implementierung</a:t>
+              <a:t>Untersuchungen</a:t>
             </a:r>
             <a:endParaRPr lang="de-DE" dirty="0"/>
           </a:p>
@@ -6775,16 +6770,31 @@
               </a:lnSpc>
             </a:pPr>
             <a:r>
-              <a:rPr lang="de-DE" b="1" dirty="0" smtClean="0"/>
-              <a:t>TODO</a:t>
-            </a:r>
+              <a:rPr lang="de-DE" dirty="0" smtClean="0"/>
+              <a:t>Verwandte Arbeiten</a:t>
+            </a:r>
+          </a:p>
+          <a:p>
+            <a:pPr lvl="1">
+              <a:lnSpc>
+                <a:spcPct val="100000"/>
+              </a:lnSpc>
+            </a:pPr>
+            <a:r>
+              <a:rPr lang="de-DE" dirty="0" smtClean="0"/>
+              <a:t>Intel SGX SDK</a:t>
+            </a:r>
+            <a:endParaRPr lang="de-DE" dirty="0"/>
+          </a:p>
+          <a:p>
+            <a:endParaRPr lang="de-DE" dirty="0"/>
           </a:p>
         </p:txBody>
       </p:sp>
     </p:spTree>
     <p:extLst>
       <p:ext uri="{BB962C8B-B14F-4D97-AF65-F5344CB8AC3E}">
-        <p14:creationId xmlns:p14="http://schemas.microsoft.com/office/powerpoint/2010/main" val="1074638792"/>
+        <p14:creationId xmlns:p14="http://schemas.microsoft.com/office/powerpoint/2010/main" val="1634766409"/>
       </p:ext>
     </p:extLst>
   </p:cSld>
@@ -6835,6 +6845,145 @@
           <a:p>
             <a:r>
               <a:rPr lang="de-DE" dirty="0" smtClean="0"/>
+              <a:t>Implementierung</a:t>
+            </a:r>
+            <a:endParaRPr lang="de-DE" dirty="0"/>
+          </a:p>
+        </p:txBody>
+      </p:sp>
+      <p:sp>
+        <p:nvSpPr>
+          <p:cNvPr id="3" name="Inhaltsplatzhalter 2"/>
+          <p:cNvSpPr>
+            <a:spLocks noGrp="1"/>
+          </p:cNvSpPr>
+          <p:nvPr>
+            <p:ph idx="1"/>
+          </p:nvPr>
+        </p:nvSpPr>
+        <p:spPr>
+          <a:xfrm>
+            <a:off x="360000" y="981939"/>
+            <a:ext cx="8784000" cy="3780000"/>
+          </a:xfrm>
+        </p:spPr>
+        <p:txBody>
+          <a:bodyPr/>
+          <a:lstStyle/>
+          <a:p>
+            <a:pPr lvl="0" defTabSz="914400">
+              <a:lnSpc>
+                <a:spcPct val="100000"/>
+              </a:lnSpc>
+              <a:spcBef>
+                <a:spcPts val="0"/>
+              </a:spcBef>
+              <a:buNone/>
+              <a:defRPr/>
+            </a:pPr>
+            <a:r>
+              <a:rPr lang="de-DE" dirty="0"/>
+              <a:t>Inhalt</a:t>
+            </a:r>
+          </a:p>
+          <a:p>
+            <a:pPr lvl="1">
+              <a:lnSpc>
+                <a:spcPct val="100000"/>
+              </a:lnSpc>
+            </a:pPr>
+            <a:r>
+              <a:rPr lang="de-DE" b="1" dirty="0" smtClean="0"/>
+              <a:t>TODO</a:t>
+            </a:r>
+            <a:endParaRPr lang="de-DE" b="1" dirty="0"/>
+          </a:p>
+          <a:p>
+            <a:pPr lvl="1">
+              <a:lnSpc>
+                <a:spcPct val="100000"/>
+              </a:lnSpc>
+            </a:pPr>
+            <a:endParaRPr lang="de-DE" dirty="0"/>
+          </a:p>
+          <a:p>
+            <a:pPr>
+              <a:lnSpc>
+                <a:spcPct val="100000"/>
+              </a:lnSpc>
+            </a:pPr>
+            <a:r>
+              <a:rPr lang="de-DE" dirty="0"/>
+              <a:t>Aufbau</a:t>
+            </a:r>
+          </a:p>
+          <a:p>
+            <a:pPr lvl="1">
+              <a:lnSpc>
+                <a:spcPct val="100000"/>
+              </a:lnSpc>
+            </a:pPr>
+            <a:r>
+              <a:rPr lang="de-DE" b="1" dirty="0" smtClean="0"/>
+              <a:t>TODO</a:t>
+            </a:r>
+          </a:p>
+        </p:txBody>
+      </p:sp>
+    </p:spTree>
+    <p:extLst>
+      <p:ext uri="{BB962C8B-B14F-4D97-AF65-F5344CB8AC3E}">
+        <p14:creationId xmlns:p14="http://schemas.microsoft.com/office/powerpoint/2010/main" val="1074638792"/>
+      </p:ext>
+    </p:extLst>
+  </p:cSld>
+  <p:clrMapOvr>
+    <a:masterClrMapping/>
+  </p:clrMapOvr>
+  <p:timing>
+    <p:tnLst>
+      <p:par>
+        <p:cTn id="1" dur="indefinite" restart="never" nodeType="tmRoot"/>
+      </p:par>
+    </p:tnLst>
+  </p:timing>
+</p:sld>
+</file>
+
+<file path=ppt/slides/slide8.xml><?xml version="1.0" encoding="utf-8"?>
+<p:sld xmlns:a="http://schemas.openxmlformats.org/drawingml/2006/main" xmlns:r="http://schemas.openxmlformats.org/officeDocument/2006/relationships" xmlns:p="http://schemas.openxmlformats.org/presentationml/2006/main">
+  <p:cSld>
+    <p:spTree>
+      <p:nvGrpSpPr>
+        <p:cNvPr id="1" name=""/>
+        <p:cNvGrpSpPr/>
+        <p:nvPr/>
+      </p:nvGrpSpPr>
+      <p:grpSpPr>
+        <a:xfrm>
+          <a:off x="0" y="0"/>
+          <a:ext cx="0" cy="0"/>
+          <a:chOff x="0" y="0"/>
+          <a:chExt cx="0" cy="0"/>
+        </a:xfrm>
+      </p:grpSpPr>
+      <p:sp>
+        <p:nvSpPr>
+          <p:cNvPr id="2" name="Titel 1"/>
+          <p:cNvSpPr>
+            <a:spLocks noGrp="1"/>
+          </p:cNvSpPr>
+          <p:nvPr>
+            <p:ph type="title"/>
+          </p:nvPr>
+        </p:nvSpPr>
+        <p:spPr/>
+        <p:txBody>
+          <a:bodyPr/>
+          <a:lstStyle/>
+          <a:p>
+            <a:r>
+              <a:rPr lang="de-DE" dirty="0" smtClean="0"/>
               <a:t>Ergebnisse</a:t>
             </a:r>
             <a:endParaRPr lang="de-DE" dirty="0"/>
@@ -6952,7 +7101,7 @@
 </p:sld>
 </file>
 
-<file path=ppt/slides/slide8.xml><?xml version="1.0" encoding="utf-8"?>
+<file path=ppt/slides/slide9.xml><?xml version="1.0" encoding="utf-8"?>
 <p:sld xmlns:a="http://schemas.openxmlformats.org/drawingml/2006/main" xmlns:r="http://schemas.openxmlformats.org/officeDocument/2006/relationships" xmlns:p="http://schemas.openxmlformats.org/presentationml/2006/main">
   <p:cSld>
     <p:spTree>

</xml_diff>